<commit_message>
nuovo jar e modifica comando readme
</commit_message>
<xml_diff>
--- a/Documentazione/Progetto eis.pptx
+++ b/Documentazione/Progetto eis.pptx
@@ -5,10 +5,10 @@
     <p:sldMasterId id="2147483648" r:id="rId4"/>
   </p:sldMasterIdLst>
   <p:notesMasterIdLst>
-    <p:notesMasterId r:id="rId14"/>
+    <p:notesMasterId r:id="rId16"/>
   </p:notesMasterIdLst>
   <p:handoutMasterIdLst>
-    <p:handoutMasterId r:id="rId15"/>
+    <p:handoutMasterId r:id="rId17"/>
   </p:handoutMasterIdLst>
   <p:sldIdLst>
     <p:sldId id="256" r:id="rId5"/>
@@ -19,7 +19,9 @@
     <p:sldId id="282" r:id="rId10"/>
     <p:sldId id="284" r:id="rId11"/>
     <p:sldId id="285" r:id="rId12"/>
-    <p:sldId id="283" r:id="rId13"/>
+    <p:sldId id="286" r:id="rId13"/>
+    <p:sldId id="287" r:id="rId14"/>
+    <p:sldId id="283" r:id="rId15"/>
   </p:sldIdLst>
   <p:sldSz cx="12192000" cy="6858000"/>
   <p:notesSz cx="6858000" cy="9144000"/>
@@ -127,6 +129,169 @@
     </p:ext>
   </p:extLst>
 </p:presentation>
+</file>
+
+<file path=ppt/commentAuthors.xml><?xml version="1.0" encoding="utf-8"?>
+<p:cmAuthorLst xmlns:a="http://schemas.openxmlformats.org/drawingml/2006/main" xmlns:r="http://schemas.openxmlformats.org/officeDocument/2006/relationships" xmlns:p="http://schemas.openxmlformats.org/presentationml/2006/main">
+  <p:cmAuthor id="1" name="claudio.bdsn21@gmail.com" initials="c" lastIdx="11" clrIdx="0">
+    <p:extLst>
+      <p:ext uri="{19B8F6BF-5375-455C-9EA6-DF929625EA0E}">
+        <p15:presenceInfo xmlns:p15="http://schemas.microsoft.com/office/powerpoint/2012/main" userId="3d66b4be171e5eb8" providerId="Windows Live"/>
+      </p:ext>
+    </p:extLst>
+  </p:cmAuthor>
+</p:cmAuthorLst>
+</file>
+
+<file path=ppt/comments/comment1.xml><?xml version="1.0" encoding="utf-8"?>
+<p:cmLst xmlns:a="http://schemas.openxmlformats.org/drawingml/2006/main" xmlns:r="http://schemas.openxmlformats.org/officeDocument/2006/relationships" xmlns:p="http://schemas.openxmlformats.org/presentationml/2006/main">
+  <p:cm authorId="1" dt="2023-06-12T18:32:16.666" idx="10">
+    <p:pos x="10" y="10"/>
+    <p:text/>
+    <p:extLst>
+      <p:ext uri="{C676402C-5697-4E1C-873F-D02D1690AC5C}">
+        <p15:threadingInfo xmlns:p15="http://schemas.microsoft.com/office/powerpoint/2012/main" timeZoneBias="-120"/>
+      </p:ext>
+    </p:extLst>
+  </p:cm>
+  <p:cm authorId="1" dt="2023-06-12T18:32:33.746" idx="11">
+    <p:pos x="10" y="146"/>
+    <p:text>Claudio o Gioia</p:text>
+    <p:extLst>
+      <p:ext uri="{C676402C-5697-4E1C-873F-D02D1690AC5C}">
+        <p15:threadingInfo xmlns:p15="http://schemas.microsoft.com/office/powerpoint/2012/main" timeZoneBias="-120">
+          <p15:parentCm authorId="1" idx="10"/>
+        </p15:threadingInfo>
+      </p:ext>
+    </p:extLst>
+  </p:cm>
+</p:cmLst>
+</file>
+
+<file path=ppt/comments/comment10.xml><?xml version="1.0" encoding="utf-8"?>
+<p:cmLst xmlns:a="http://schemas.openxmlformats.org/drawingml/2006/main" xmlns:r="http://schemas.openxmlformats.org/officeDocument/2006/relationships" xmlns:p="http://schemas.openxmlformats.org/presentationml/2006/main">
+  <p:cm authorId="1" dt="2023-06-12T18:30:26.050" idx="1">
+    <p:pos x="10" y="10"/>
+    <p:text>roccheggiani</p:text>
+    <p:extLst>
+      <p:ext uri="{C676402C-5697-4E1C-873F-D02D1690AC5C}">
+        <p15:threadingInfo xmlns:p15="http://schemas.microsoft.com/office/powerpoint/2012/main" timeZoneBias="-120"/>
+      </p:ext>
+    </p:extLst>
+  </p:cm>
+</p:cmLst>
+</file>
+
+<file path=ppt/comments/comment2.xml><?xml version="1.0" encoding="utf-8"?>
+<p:cmLst xmlns:a="http://schemas.openxmlformats.org/drawingml/2006/main" xmlns:r="http://schemas.openxmlformats.org/officeDocument/2006/relationships" xmlns:p="http://schemas.openxmlformats.org/presentationml/2006/main">
+  <p:cm authorId="1" dt="2023-06-12T18:32:08.995" idx="9">
+    <p:pos x="10" y="10"/>
+    <p:text>Claudio</p:text>
+    <p:extLst>
+      <p:ext uri="{C676402C-5697-4E1C-873F-D02D1690AC5C}">
+        <p15:threadingInfo xmlns:p15="http://schemas.microsoft.com/office/powerpoint/2012/main" timeZoneBias="-120"/>
+      </p:ext>
+    </p:extLst>
+  </p:cm>
+</p:cmLst>
+</file>
+
+<file path=ppt/comments/comment3.xml><?xml version="1.0" encoding="utf-8"?>
+<p:cmLst xmlns:a="http://schemas.openxmlformats.org/drawingml/2006/main" xmlns:r="http://schemas.openxmlformats.org/officeDocument/2006/relationships" xmlns:p="http://schemas.openxmlformats.org/presentationml/2006/main">
+  <p:cm authorId="1" dt="2023-06-12T18:32:03.720" idx="8">
+    <p:pos x="10" y="10"/>
+    <p:text>Malve</p:text>
+    <p:extLst>
+      <p:ext uri="{C676402C-5697-4E1C-873F-D02D1690AC5C}">
+        <p15:threadingInfo xmlns:p15="http://schemas.microsoft.com/office/powerpoint/2012/main" timeZoneBias="-120"/>
+      </p:ext>
+    </p:extLst>
+  </p:cm>
+</p:cmLst>
+</file>
+
+<file path=ppt/comments/comment4.xml><?xml version="1.0" encoding="utf-8"?>
+<p:cmLst xmlns:a="http://schemas.openxmlformats.org/drawingml/2006/main" xmlns:r="http://schemas.openxmlformats.org/officeDocument/2006/relationships" xmlns:p="http://schemas.openxmlformats.org/presentationml/2006/main">
+  <p:cm authorId="1" dt="2023-06-12T18:31:55.678" idx="7">
+    <p:pos x="10" y="10"/>
+    <p:text>Gioia</p:text>
+    <p:extLst>
+      <p:ext uri="{C676402C-5697-4E1C-873F-D02D1690AC5C}">
+        <p15:threadingInfo xmlns:p15="http://schemas.microsoft.com/office/powerpoint/2012/main" timeZoneBias="-120"/>
+      </p:ext>
+    </p:extLst>
+  </p:cm>
+</p:cmLst>
+</file>
+
+<file path=ppt/comments/comment5.xml><?xml version="1.0" encoding="utf-8"?>
+<p:cmLst xmlns:a="http://schemas.openxmlformats.org/drawingml/2006/main" xmlns:r="http://schemas.openxmlformats.org/officeDocument/2006/relationships" xmlns:p="http://schemas.openxmlformats.org/presentationml/2006/main">
+  <p:cm authorId="1" dt="2023-06-12T18:31:51.099" idx="6">
+    <p:pos x="10" y="10"/>
+    <p:text>Gioia</p:text>
+    <p:extLst>
+      <p:ext uri="{C676402C-5697-4E1C-873F-D02D1690AC5C}">
+        <p15:threadingInfo xmlns:p15="http://schemas.microsoft.com/office/powerpoint/2012/main" timeZoneBias="-120"/>
+      </p:ext>
+    </p:extLst>
+  </p:cm>
+</p:cmLst>
+</file>
+
+<file path=ppt/comments/comment6.xml><?xml version="1.0" encoding="utf-8"?>
+<p:cmLst xmlns:a="http://schemas.openxmlformats.org/drawingml/2006/main" xmlns:r="http://schemas.openxmlformats.org/officeDocument/2006/relationships" xmlns:p="http://schemas.openxmlformats.org/presentationml/2006/main">
+  <p:cm authorId="1" dt="2023-06-12T18:31:46.155" idx="5">
+    <p:pos x="10" y="10"/>
+    <p:text>Rock</p:text>
+    <p:extLst>
+      <p:ext uri="{C676402C-5697-4E1C-873F-D02D1690AC5C}">
+        <p15:threadingInfo xmlns:p15="http://schemas.microsoft.com/office/powerpoint/2012/main" timeZoneBias="-120"/>
+      </p:ext>
+    </p:extLst>
+  </p:cm>
+</p:cmLst>
+</file>
+
+<file path=ppt/comments/comment7.xml><?xml version="1.0" encoding="utf-8"?>
+<p:cmLst xmlns:a="http://schemas.openxmlformats.org/drawingml/2006/main" xmlns:r="http://schemas.openxmlformats.org/officeDocument/2006/relationships" xmlns:p="http://schemas.openxmlformats.org/presentationml/2006/main">
+  <p:cm authorId="1" dt="2023-06-12T18:30:55.518" idx="4">
+    <p:pos x="10" y="10"/>
+    <p:text>Malve</p:text>
+    <p:extLst>
+      <p:ext uri="{C676402C-5697-4E1C-873F-D02D1690AC5C}">
+        <p15:threadingInfo xmlns:p15="http://schemas.microsoft.com/office/powerpoint/2012/main" timeZoneBias="-120"/>
+      </p:ext>
+    </p:extLst>
+  </p:cm>
+</p:cmLst>
+</file>
+
+<file path=ppt/comments/comment8.xml><?xml version="1.0" encoding="utf-8"?>
+<p:cmLst xmlns:a="http://schemas.openxmlformats.org/drawingml/2006/main" xmlns:r="http://schemas.openxmlformats.org/officeDocument/2006/relationships" xmlns:p="http://schemas.openxmlformats.org/presentationml/2006/main">
+  <p:cm authorId="1" dt="2023-06-12T18:30:49.831" idx="3">
+    <p:pos x="10" y="10"/>
+    <p:text>Malve</p:text>
+    <p:extLst>
+      <p:ext uri="{C676402C-5697-4E1C-873F-D02D1690AC5C}">
+        <p15:threadingInfo xmlns:p15="http://schemas.microsoft.com/office/powerpoint/2012/main" timeZoneBias="-120"/>
+      </p:ext>
+    </p:extLst>
+  </p:cm>
+</p:cmLst>
+</file>
+
+<file path=ppt/comments/comment9.xml><?xml version="1.0" encoding="utf-8"?>
+<p:cmLst xmlns:a="http://schemas.openxmlformats.org/drawingml/2006/main" xmlns:r="http://schemas.openxmlformats.org/officeDocument/2006/relationships" xmlns:p="http://schemas.openxmlformats.org/presentationml/2006/main">
+  <p:cm authorId="1" dt="2023-06-12T18:30:41.415" idx="2">
+    <p:pos x="10" y="10"/>
+    <p:text>Claudio o Gioia</p:text>
+    <p:extLst>
+      <p:ext uri="{C676402C-5697-4E1C-873F-D02D1690AC5C}">
+        <p15:threadingInfo xmlns:p15="http://schemas.microsoft.com/office/powerpoint/2012/main" timeZoneBias="-120"/>
+      </p:ext>
+    </p:extLst>
+  </p:cm>
+</p:cmLst>
 </file>
 
 <file path=ppt/handoutMasters/handoutMaster1.xml><?xml version="1.0" encoding="utf-8"?>
@@ -21539,6 +21704,178 @@
 </p:sld>
 </file>
 
+<file path=ppt/slides/slide10.xml><?xml version="1.0" encoding="utf-8"?>
+<p:sld xmlns:a="http://schemas.openxmlformats.org/drawingml/2006/main" xmlns:r="http://schemas.openxmlformats.org/officeDocument/2006/relationships" xmlns:p="http://schemas.openxmlformats.org/presentationml/2006/main">
+  <p:cSld>
+    <p:spTree>
+      <p:nvGrpSpPr>
+        <p:cNvPr id="1" name=""/>
+        <p:cNvGrpSpPr/>
+        <p:nvPr/>
+      </p:nvGrpSpPr>
+      <p:grpSpPr>
+        <a:xfrm>
+          <a:off x="0" y="0"/>
+          <a:ext cx="0" cy="0"/>
+          <a:chOff x="0" y="0"/>
+          <a:chExt cx="0" cy="0"/>
+        </a:xfrm>
+      </p:grpSpPr>
+      <p:sp>
+        <p:nvSpPr>
+          <p:cNvPr id="2" name="Titolo 1">
+            <a:extLst>
+              <a:ext uri="{FF2B5EF4-FFF2-40B4-BE49-F238E27FC236}">
+                <a16:creationId xmlns:a16="http://schemas.microsoft.com/office/drawing/2014/main" id="{3B2F0135-B8BA-BBB4-3FFD-C87875BC3F53}"/>
+              </a:ext>
+            </a:extLst>
+          </p:cNvPr>
+          <p:cNvSpPr>
+            <a:spLocks noGrp="1"/>
+          </p:cNvSpPr>
+          <p:nvPr>
+            <p:ph type="title"/>
+          </p:nvPr>
+        </p:nvSpPr>
+        <p:spPr/>
+        <p:txBody>
+          <a:bodyPr/>
+          <a:lstStyle/>
+          <a:p>
+            <a:r>
+              <a:rPr lang="it-IT" dirty="0" err="1"/>
+              <a:t>deSerializzatore</a:t>
+            </a:r>
+            <a:endParaRPr lang="it-IT" dirty="0"/>
+          </a:p>
+        </p:txBody>
+      </p:sp>
+      <p:pic>
+        <p:nvPicPr>
+          <p:cNvPr id="5" name="Immagine 4">
+            <a:extLst>
+              <a:ext uri="{FF2B5EF4-FFF2-40B4-BE49-F238E27FC236}">
+                <a16:creationId xmlns:a16="http://schemas.microsoft.com/office/drawing/2014/main" id="{4146B1FF-BFCB-9916-9EF5-C0694C867B41}"/>
+              </a:ext>
+            </a:extLst>
+          </p:cNvPr>
+          <p:cNvPicPr>
+            <a:picLocks noChangeAspect="1"/>
+          </p:cNvPicPr>
+          <p:nvPr/>
+        </p:nvPicPr>
+        <p:blipFill>
+          <a:blip r:embed="rId2"/>
+          <a:stretch>
+            <a:fillRect/>
+          </a:stretch>
+        </p:blipFill>
+        <p:spPr>
+          <a:xfrm>
+            <a:off x="2934677" y="1684312"/>
+            <a:ext cx="6322645" cy="4588472"/>
+          </a:xfrm>
+          <a:prstGeom prst="rect">
+            <a:avLst/>
+          </a:prstGeom>
+        </p:spPr>
+      </p:pic>
+    </p:spTree>
+    <p:extLst>
+      <p:ext uri="{BB962C8B-B14F-4D97-AF65-F5344CB8AC3E}">
+        <p14:creationId xmlns:p14="http://schemas.microsoft.com/office/powerpoint/2010/main" val="1116692863"/>
+      </p:ext>
+    </p:extLst>
+  </p:cSld>
+  <p:clrMapOvr>
+    <a:masterClrMapping/>
+  </p:clrMapOvr>
+</p:sld>
+</file>
+
+<file path=ppt/slides/slide11.xml><?xml version="1.0" encoding="utf-8"?>
+<p:sld xmlns:a="http://schemas.openxmlformats.org/drawingml/2006/main" xmlns:r="http://schemas.openxmlformats.org/officeDocument/2006/relationships" xmlns:p="http://schemas.openxmlformats.org/presentationml/2006/main">
+  <p:cSld>
+    <p:spTree>
+      <p:nvGrpSpPr>
+        <p:cNvPr id="1" name=""/>
+        <p:cNvGrpSpPr/>
+        <p:nvPr/>
+      </p:nvGrpSpPr>
+      <p:grpSpPr>
+        <a:xfrm>
+          <a:off x="0" y="0"/>
+          <a:ext cx="0" cy="0"/>
+          <a:chOff x="0" y="0"/>
+          <a:chExt cx="0" cy="0"/>
+        </a:xfrm>
+      </p:grpSpPr>
+      <p:sp>
+        <p:nvSpPr>
+          <p:cNvPr id="2" name="Titolo 1">
+            <a:extLst>
+              <a:ext uri="{FF2B5EF4-FFF2-40B4-BE49-F238E27FC236}">
+                <a16:creationId xmlns:a16="http://schemas.microsoft.com/office/drawing/2014/main" id="{66D8D9BF-7AC8-51F3-05B6-E0D2E9B2ECFF}"/>
+              </a:ext>
+            </a:extLst>
+          </p:cNvPr>
+          <p:cNvSpPr>
+            <a:spLocks noGrp="1"/>
+          </p:cNvSpPr>
+          <p:nvPr>
+            <p:ph type="title"/>
+          </p:nvPr>
+        </p:nvSpPr>
+        <p:spPr/>
+        <p:txBody>
+          <a:bodyPr/>
+          <a:lstStyle/>
+          <a:p>
+            <a:r>
+              <a:rPr lang="it-IT" dirty="0"/>
+              <a:t>test</a:t>
+            </a:r>
+          </a:p>
+        </p:txBody>
+      </p:sp>
+      <p:sp>
+        <p:nvSpPr>
+          <p:cNvPr id="3" name="Segnaposto contenuto 2">
+            <a:extLst>
+              <a:ext uri="{FF2B5EF4-FFF2-40B4-BE49-F238E27FC236}">
+                <a16:creationId xmlns:a16="http://schemas.microsoft.com/office/drawing/2014/main" id="{15960802-E7F5-DD50-0465-DE66129F0B57}"/>
+              </a:ext>
+            </a:extLst>
+          </p:cNvPr>
+          <p:cNvSpPr>
+            <a:spLocks noGrp="1"/>
+          </p:cNvSpPr>
+          <p:nvPr>
+            <p:ph idx="1"/>
+          </p:nvPr>
+        </p:nvSpPr>
+        <p:spPr/>
+        <p:txBody>
+          <a:bodyPr/>
+          <a:lstStyle/>
+          <a:p>
+            <a:endParaRPr lang="it-IT"/>
+          </a:p>
+        </p:txBody>
+      </p:sp>
+    </p:spTree>
+    <p:extLst>
+      <p:ext uri="{BB962C8B-B14F-4D97-AF65-F5344CB8AC3E}">
+        <p14:creationId xmlns:p14="http://schemas.microsoft.com/office/powerpoint/2010/main" val="1007829844"/>
+      </p:ext>
+    </p:extLst>
+  </p:cSld>
+  <p:clrMapOvr>
+    <a:masterClrMapping/>
+  </p:clrMapOvr>
+</p:sld>
+</file>
+
 <file path=ppt/slides/slide2.xml><?xml version="1.0" encoding="utf-8"?>
 <p:sld xmlns:a="http://schemas.openxmlformats.org/drawingml/2006/main" xmlns:r="http://schemas.openxmlformats.org/officeDocument/2006/relationships" xmlns:p="http://schemas.openxmlformats.org/presentationml/2006/main">
   <p:cSld>
@@ -22388,7 +22725,7 @@
           <p:cNvPr id="2" name="Titolo 1">
             <a:extLst>
               <a:ext uri="{FF2B5EF4-FFF2-40B4-BE49-F238E27FC236}">
-                <a16:creationId xmlns:a16="http://schemas.microsoft.com/office/drawing/2014/main" id="{66D8D9BF-7AC8-51F3-05B6-E0D2E9B2ECFF}"/>
+                <a16:creationId xmlns:a16="http://schemas.microsoft.com/office/drawing/2014/main" id="{83A9F741-5BEB-4043-4D0D-F833A8AE872C}"/>
               </a:ext>
             </a:extLst>
           </p:cNvPr>
@@ -22405,41 +22742,47 @@
           <a:lstStyle/>
           <a:p>
             <a:r>
-              <a:rPr lang="it-IT" dirty="0"/>
-              <a:t>test</a:t>
+              <a:rPr lang="it-IT" dirty="0" err="1"/>
+              <a:t>Serializzatore</a:t>
             </a:r>
+            <a:endParaRPr lang="it-IT" dirty="0"/>
           </a:p>
         </p:txBody>
       </p:sp>
-      <p:sp>
-        <p:nvSpPr>
-          <p:cNvPr id="3" name="Segnaposto contenuto 2">
+      <p:pic>
+        <p:nvPicPr>
+          <p:cNvPr id="9" name="Immagine 8">
             <a:extLst>
               <a:ext uri="{FF2B5EF4-FFF2-40B4-BE49-F238E27FC236}">
-                <a16:creationId xmlns:a16="http://schemas.microsoft.com/office/drawing/2014/main" id="{15960802-E7F5-DD50-0465-DE66129F0B57}"/>
+                <a16:creationId xmlns:a16="http://schemas.microsoft.com/office/drawing/2014/main" id="{B60C5F80-2418-A282-BDA2-0E97FEC746F5}"/>
               </a:ext>
             </a:extLst>
           </p:cNvPr>
-          <p:cNvSpPr>
-            <a:spLocks noGrp="1"/>
-          </p:cNvSpPr>
-          <p:nvPr>
-            <p:ph idx="1"/>
-          </p:nvPr>
-        </p:nvSpPr>
-        <p:spPr/>
-        <p:txBody>
-          <a:bodyPr/>
-          <a:lstStyle/>
-          <a:p>
-            <a:endParaRPr lang="it-IT"/>
-          </a:p>
-        </p:txBody>
-      </p:sp>
+          <p:cNvPicPr>
+            <a:picLocks noChangeAspect="1"/>
+          </p:cNvPicPr>
+          <p:nvPr/>
+        </p:nvPicPr>
+        <p:blipFill>
+          <a:blip r:embed="rId2"/>
+          <a:stretch>
+            <a:fillRect/>
+          </a:stretch>
+        </p:blipFill>
+        <p:spPr>
+          <a:xfrm>
+            <a:off x="2707133" y="1861928"/>
+            <a:ext cx="6354062" cy="4258269"/>
+          </a:xfrm>
+          <a:prstGeom prst="rect">
+            <a:avLst/>
+          </a:prstGeom>
+        </p:spPr>
+      </p:pic>
     </p:spTree>
     <p:extLst>
       <p:ext uri="{BB962C8B-B14F-4D97-AF65-F5344CB8AC3E}">
-        <p14:creationId xmlns:p14="http://schemas.microsoft.com/office/powerpoint/2010/main" val="1007829844"/>
+        <p14:creationId xmlns:p14="http://schemas.microsoft.com/office/powerpoint/2010/main" val="1784886502"/>
       </p:ext>
     </p:extLst>
   </p:cSld>
@@ -23274,20 +23617,20 @@
 </file>
 
 <file path=customXml/item1.xml><?xml version="1.0" encoding="utf-8"?>
+<p:properties xmlns:p="http://schemas.microsoft.com/office/2006/metadata/properties" xmlns:xsi="http://www.w3.org/2001/XMLSchema-instance" xmlns:pc="http://schemas.microsoft.com/office/infopath/2007/PartnerControls">
+  <documentManagement>
+    <MediaServiceKeyPoints xmlns="71af3243-3dd4-4a8d-8c0d-dd76da1f02a5" xsi:nil="true"/>
+  </documentManagement>
+</p:properties>
+</file>
+
+<file path=customXml/item2.xml><?xml version="1.0" encoding="utf-8"?>
 <?mso-contentType ?>
 <FormTemplates xmlns="http://schemas.microsoft.com/sharepoint/v3/contenttype/forms">
   <Display>DocumentLibraryForm</Display>
   <Edit>DocumentLibraryForm</Edit>
   <New>DocumentLibraryForm</New>
 </FormTemplates>
-</file>
-
-<file path=customXml/item2.xml><?xml version="1.0" encoding="utf-8"?>
-<p:properties xmlns:p="http://schemas.microsoft.com/office/2006/metadata/properties" xmlns:xsi="http://www.w3.org/2001/XMLSchema-instance" xmlns:pc="http://schemas.microsoft.com/office/infopath/2007/PartnerControls">
-  <documentManagement>
-    <MediaServiceKeyPoints xmlns="71af3243-3dd4-4a8d-8c0d-dd76da1f02a5" xsi:nil="true"/>
-  </documentManagement>
-</p:properties>
 </file>
 
 <file path=customXml/item3.xml><?xml version="1.0" encoding="utf-8"?>
@@ -23502,19 +23845,19 @@
 </file>
 
 <file path=customXml/itemProps1.xml><?xml version="1.0" encoding="utf-8"?>
-<ds:datastoreItem xmlns:ds="http://schemas.openxmlformats.org/officeDocument/2006/customXml" ds:itemID="{4F44C90D-2A62-4985-9618-3460247437B1}">
+<ds:datastoreItem xmlns:ds="http://schemas.openxmlformats.org/officeDocument/2006/customXml" ds:itemID="{788A2F88-55C5-4ED1-9541-807C65424763}">
   <ds:schemaRefs>
-    <ds:schemaRef ds:uri="http://schemas.microsoft.com/sharepoint/v3/contenttype/forms"/>
+    <ds:schemaRef ds:uri="http://schemas.microsoft.com/office/2006/metadata/properties"/>
+    <ds:schemaRef ds:uri="http://schemas.microsoft.com/office/infopath/2007/PartnerControls"/>
+    <ds:schemaRef ds:uri="71af3243-3dd4-4a8d-8c0d-dd76da1f02a5"/>
   </ds:schemaRefs>
 </ds:datastoreItem>
 </file>
 
 <file path=customXml/itemProps2.xml><?xml version="1.0" encoding="utf-8"?>
-<ds:datastoreItem xmlns:ds="http://schemas.openxmlformats.org/officeDocument/2006/customXml" ds:itemID="{788A2F88-55C5-4ED1-9541-807C65424763}">
+<ds:datastoreItem xmlns:ds="http://schemas.openxmlformats.org/officeDocument/2006/customXml" ds:itemID="{4F44C90D-2A62-4985-9618-3460247437B1}">
   <ds:schemaRefs>
-    <ds:schemaRef ds:uri="http://schemas.microsoft.com/office/2006/metadata/properties"/>
-    <ds:schemaRef ds:uri="http://schemas.microsoft.com/office/infopath/2007/PartnerControls"/>
-    <ds:schemaRef ds:uri="71af3243-3dd4-4a8d-8c0d-dd76da1f02a5"/>
+    <ds:schemaRef ds:uri="http://schemas.microsoft.com/sharepoint/v3/contenttype/forms"/>
   </ds:schemaRefs>
 </ds:datastoreItem>
 </file>

</xml_diff>